<commit_message>
Update PP - end
</commit_message>
<xml_diff>
--- a/Improgress/PM-3.pptx
+++ b/Improgress/PM-3.pptx
@@ -9545,10 +9545,10 @@
       </p:sp>
       <p:pic>
         <p:nvPicPr>
-          <p:cNvPr id="7" name="Hình ảnh 1">
+          <p:cNvPr id="8" name="Hình ảnh 6">
             <a:extLst>
               <a:ext uri="{FF2B5EF4-FFF2-40B4-BE49-F238E27FC236}">
-                <a16:creationId xmlns:a16="http://schemas.microsoft.com/office/drawing/2014/main" id="{6BA9B8BA-8907-7C45-A93B-5314CE7F8F21}"/>
+                <a16:creationId xmlns:a16="http://schemas.microsoft.com/office/drawing/2014/main" id="{6D929230-7357-EF4F-981E-47BAEC69BF39}"/>
               </a:ext>
             </a:extLst>
           </p:cNvPr>
@@ -9570,8 +9570,8 @@
         </p:blipFill>
         <p:spPr bwMode="auto">
           <a:xfrm>
-            <a:off x="3128009" y="2122984"/>
-            <a:ext cx="5935980" cy="4282347"/>
+            <a:off x="3124200" y="2122984"/>
+            <a:ext cx="5943600" cy="4430216"/>
           </a:xfrm>
           <a:prstGeom prst="rect">
             <a:avLst/>
@@ -9604,89 +9604,6 @@
       </p:transition>
     </mc:Fallback>
   </mc:AlternateContent>
-  <p:timing>
-    <p:tnLst>
-      <p:par>
-        <p:cTn id="1" dur="indefinite" restart="never" nodeType="tmRoot">
-          <p:childTnLst>
-            <p:seq concurrent="1" nextAc="seek">
-              <p:cTn id="2" dur="indefinite" nodeType="mainSeq">
-                <p:childTnLst>
-                  <p:par>
-                    <p:cTn id="3" fill="hold">
-                      <p:stCondLst>
-                        <p:cond delay="indefinite"/>
-                      </p:stCondLst>
-                      <p:childTnLst>
-                        <p:par>
-                          <p:cTn id="4" fill="hold">
-                            <p:stCondLst>
-                              <p:cond delay="0"/>
-                            </p:stCondLst>
-                            <p:childTnLst>
-                              <p:par>
-                                <p:cTn id="5" presetID="5" presetClass="entr" presetSubtype="10" fill="hold" nodeType="clickEffect">
-                                  <p:stCondLst>
-                                    <p:cond delay="0"/>
-                                  </p:stCondLst>
-                                  <p:childTnLst>
-                                    <p:set>
-                                      <p:cBhvr>
-                                        <p:cTn id="6" dur="1" fill="hold">
-                                          <p:stCondLst>
-                                            <p:cond delay="0"/>
-                                          </p:stCondLst>
-                                        </p:cTn>
-                                        <p:tgtEl>
-                                          <p:spTgt spid="7"/>
-                                        </p:tgtEl>
-                                        <p:attrNameLst>
-                                          <p:attrName>style.visibility</p:attrName>
-                                        </p:attrNameLst>
-                                      </p:cBhvr>
-                                      <p:to>
-                                        <p:strVal val="visible"/>
-                                      </p:to>
-                                    </p:set>
-                                    <p:animEffect transition="in" filter="checkerboard(across)">
-                                      <p:cBhvr>
-                                        <p:cTn id="7" dur="500"/>
-                                        <p:tgtEl>
-                                          <p:spTgt spid="7"/>
-                                        </p:tgtEl>
-                                      </p:cBhvr>
-                                    </p:animEffect>
-                                  </p:childTnLst>
-                                </p:cTn>
-                              </p:par>
-                            </p:childTnLst>
-                          </p:cTn>
-                        </p:par>
-                      </p:childTnLst>
-                    </p:cTn>
-                  </p:par>
-                </p:childTnLst>
-              </p:cTn>
-              <p:prevCondLst>
-                <p:cond evt="onPrev" delay="0">
-                  <p:tgtEl>
-                    <p:sldTgt/>
-                  </p:tgtEl>
-                </p:cond>
-              </p:prevCondLst>
-              <p:nextCondLst>
-                <p:cond evt="onNext" delay="0">
-                  <p:tgtEl>
-                    <p:sldTgt/>
-                  </p:tgtEl>
-                </p:cond>
-              </p:nextCondLst>
-            </p:seq>
-          </p:childTnLst>
-        </p:cTn>
-      </p:par>
-    </p:tnLst>
-  </p:timing>
 </p:sld>
 </file>
 

</xml_diff>